<commit_message>
pc project ppt changes
</commit_message>
<xml_diff>
--- a/pc/Mini Project PPT Template.pptx
+++ b/pc/Mini Project PPT Template.pptx
@@ -217,7 +217,7 @@
             <a:fld id="{D07E31E1-E674-4965-BF14-75B4A47FCCE7}" type="datetimeFigureOut">
               <a:rPr lang="en-US" smtClean="0"/>
               <a:pPr/>
-              <a:t>9/24/19</a:t>
+              <a:t>9/25/19</a:t>
             </a:fld>
             <a:endParaRPr lang="en-US"/>
           </a:p>
@@ -5917,20 +5917,20 @@
         </p:nvSpPr>
         <p:spPr>
           <a:xfrm>
-            <a:off x="876300" y="2286000"/>
-            <a:ext cx="7467600" cy="1828800"/>
+            <a:off x="876300" y="268952"/>
+            <a:ext cx="7467600" cy="3845848"/>
           </a:xfrm>
         </p:spPr>
         <p:txBody>
           <a:bodyPr>
-            <a:normAutofit fontScale="90000"/>
+            <a:normAutofit/>
           </a:bodyPr>
           <a:lstStyle/>
           <a:p>
             <a:pPr algn="ctr"/>
             <a:r>
-              <a:rPr lang="en-US" dirty="0"/>
-              <a:t>Parallelizing the Technique of Deeply Joint Initialization of Neural Networks With Decision Trees</a:t>
+              <a:rPr lang="en-US" sz="4400" dirty="0"/>
+              <a:t>Parallelizing the set-up of Deeply Joint Informed Neural Networks With Decision Trees</a:t>
             </a:r>
           </a:p>
         </p:txBody>
@@ -6425,7 +6425,7 @@
             <a:pPr algn="just"/>
             <a:r>
               <a:rPr lang="en-US" dirty="0"/>
-              <a:t>The combining of DJINN  with Decision Trees demonstrate high predictive performance for a variety of regression and classification data sets and display comparable performance to Bayesian hyperparameter optimization at a lower computational cost and in a flexible and scalable manner. We propose to </a:t>
+              <a:t>The combination of neural networks with Decision Trees known as DJINN demonstrate high predictive performance for a variety of regression and classification data sets and display comparable performance to Bayesian hyperparameter optimization at a lower computational cost and in a flexible and scalable manner. We propose to </a:t>
             </a:r>
             <a:r>
               <a:rPr lang="en-US" dirty="0" err="1"/>
@@ -6581,7 +6581,7 @@
           <a:p>
             <a:r>
               <a:rPr lang="en-US" dirty="0"/>
-              <a:t>Thus, DJINN initialization coupled with decision trees provides a good way to train a model better and in turn achieve better accuracy. But due to the limitations of computing power, this comes at the cost of high initialization time.</a:t>
+              <a:t>Thus, DJINN models provide a good way to train a model better and in turn achieve better accuracy. But due to the limitations of computing power, this comes at the cost of high initialization time.</a:t>
             </a:r>
           </a:p>
           <a:p>
@@ -6776,7 +6776,7 @@
             </a:pPr>
             <a:r>
               <a:rPr lang="en-US" dirty="0"/>
-              <a:t>We first implement the DJINN on a generic Neural Network data set and improve its performance using Decision Trees</a:t>
+              <a:t>We first implement the DJINN on a generic Neural Network data set by improving its performance using Decision Trees</a:t>
             </a:r>
           </a:p>
           <a:p>

</xml_diff>

<commit_message>
PC project presentation updated
</commit_message>
<xml_diff>
--- a/pc/Mini Project PPT Template.pptx
+++ b/pc/Mini Project PPT Template.pptx
@@ -1,11 +1,11 @@
 
 <file path=ppt/presentation.xml><?xml version="1.0" encoding="utf-8"?>
-<p:presentation xmlns:a="http://schemas.openxmlformats.org/drawingml/2006/main" xmlns:r="http://schemas.openxmlformats.org/officeDocument/2006/relationships" xmlns:p="http://schemas.openxmlformats.org/presentationml/2006/main" saveSubsetFonts="1">
+<p:presentation xmlns:a="http://schemas.openxmlformats.org/drawingml/2006/main" xmlns:r="http://schemas.openxmlformats.org/officeDocument/2006/relationships" xmlns:p="http://schemas.openxmlformats.org/presentationml/2006/main" firstSlideNum="2" saveSubsetFonts="1">
   <p:sldMasterIdLst>
     <p:sldMasterId id="2147483681" r:id="rId1"/>
   </p:sldMasterIdLst>
   <p:notesMasterIdLst>
-    <p:notesMasterId r:id="rId11"/>
+    <p:notesMasterId r:id="rId12"/>
   </p:notesMasterIdLst>
   <p:sldIdLst>
     <p:sldId id="256" r:id="rId2"/>
@@ -13,10 +13,11 @@
     <p:sldId id="258" r:id="rId4"/>
     <p:sldId id="263" r:id="rId5"/>
     <p:sldId id="264" r:id="rId6"/>
-    <p:sldId id="316" r:id="rId7"/>
-    <p:sldId id="323" r:id="rId8"/>
-    <p:sldId id="324" r:id="rId9"/>
-    <p:sldId id="325" r:id="rId10"/>
+    <p:sldId id="326" r:id="rId7"/>
+    <p:sldId id="316" r:id="rId8"/>
+    <p:sldId id="327" r:id="rId9"/>
+    <p:sldId id="328" r:id="rId10"/>
+    <p:sldId id="325" r:id="rId11"/>
   </p:sldIdLst>
   <p:sldSz cx="9144000" cy="6858000" type="screen4x3"/>
   <p:notesSz cx="6858000" cy="9144000"/>
@@ -217,7 +218,7 @@
             <a:fld id="{D07E31E1-E674-4965-BF14-75B4A47FCCE7}" type="datetimeFigureOut">
               <a:rPr lang="en-US" smtClean="0"/>
               <a:pPr/>
-              <a:t>9/25/19</a:t>
+              <a:t>11/6/19</a:t>
             </a:fld>
             <a:endParaRPr lang="en-US"/>
           </a:p>
@@ -769,7 +770,7 @@
           <a:p>
             <a:r>
               <a:rPr lang="en-IN"/>
-              <a:t>25-Sep-19</a:t>
+              <a:t>06-Nov-19</a:t>
             </a:r>
             <a:endParaRPr lang="en-US"/>
           </a:p>
@@ -792,7 +793,7 @@
           <a:p>
             <a:r>
               <a:rPr lang="en-US"/>
-              <a:t>PC Project Midsem Evaluation</a:t>
+              <a:t>PC Project Evaluation</a:t>
             </a:r>
           </a:p>
         </p:txBody>
@@ -1091,7 +1092,7 @@
           <a:p>
             <a:r>
               <a:rPr lang="en-IN"/>
-              <a:t>25-Sep-19</a:t>
+              <a:t>06-Nov-19</a:t>
             </a:r>
             <a:endParaRPr lang="en-US"/>
           </a:p>
@@ -1114,7 +1115,7 @@
           <a:p>
             <a:r>
               <a:rPr lang="en-US"/>
-              <a:t>PC Project Midsem Evaluation</a:t>
+              <a:t>PC Project Evaluation</a:t>
             </a:r>
           </a:p>
         </p:txBody>
@@ -1583,7 +1584,7 @@
           <a:p>
             <a:r>
               <a:rPr lang="en-IN"/>
-              <a:t>25-Sep-19</a:t>
+              <a:t>06-Nov-19</a:t>
             </a:r>
             <a:endParaRPr lang="en-US"/>
           </a:p>
@@ -1606,7 +1607,7 @@
           <a:p>
             <a:r>
               <a:rPr lang="en-US"/>
-              <a:t>PC Project Midsem Evaluation</a:t>
+              <a:t>PC Project Evaluation</a:t>
             </a:r>
           </a:p>
         </p:txBody>
@@ -1956,7 +1957,7 @@
           <a:p>
             <a:r>
               <a:rPr lang="en-IN"/>
-              <a:t>25-Sep-19</a:t>
+              <a:t>06-Nov-19</a:t>
             </a:r>
             <a:endParaRPr lang="en-US"/>
           </a:p>
@@ -1979,7 +1980,7 @@
           <a:p>
             <a:r>
               <a:rPr lang="en-US"/>
-              <a:t>PC Project Midsem Evaluation</a:t>
+              <a:t>PC Project Evaluation</a:t>
             </a:r>
           </a:p>
         </p:txBody>
@@ -2233,7 +2234,7 @@
           <a:p>
             <a:r>
               <a:rPr lang="en-IN"/>
-              <a:t>25-Sep-19</a:t>
+              <a:t>06-Nov-19</a:t>
             </a:r>
             <a:endParaRPr lang="en-US"/>
           </a:p>
@@ -2256,7 +2257,7 @@
           <a:p>
             <a:r>
               <a:rPr lang="en-US"/>
-              <a:t>PC Project Midsem Evaluation</a:t>
+              <a:t>PC Project Evaluation</a:t>
             </a:r>
           </a:p>
         </p:txBody>
@@ -2563,7 +2564,7 @@
           <a:p>
             <a:r>
               <a:rPr lang="en-IN"/>
-              <a:t>25-Sep-19</a:t>
+              <a:t>06-Nov-19</a:t>
             </a:r>
             <a:endParaRPr lang="en-US"/>
           </a:p>
@@ -2586,7 +2587,7 @@
           <a:p>
             <a:r>
               <a:rPr lang="en-US"/>
-              <a:t>PC Project Midsem Evaluation</a:t>
+              <a:t>PC Project Evaluation</a:t>
             </a:r>
           </a:p>
         </p:txBody>
@@ -2845,7 +2846,7 @@
           <a:p>
             <a:r>
               <a:rPr lang="en-IN"/>
-              <a:t>25-Sep-19</a:t>
+              <a:t>06-Nov-19</a:t>
             </a:r>
             <a:endParaRPr lang="en-US"/>
           </a:p>
@@ -2868,7 +2869,7 @@
           <a:p>
             <a:r>
               <a:rPr lang="en-US"/>
-              <a:t>PC Project Midsem Evaluation</a:t>
+              <a:t>PC Project Evaluation</a:t>
             </a:r>
           </a:p>
         </p:txBody>
@@ -3236,7 +3237,7 @@
           <a:p>
             <a:r>
               <a:rPr lang="en-IN"/>
-              <a:t>25-Sep-19</a:t>
+              <a:t>06-Nov-19</a:t>
             </a:r>
             <a:endParaRPr lang="en-US"/>
           </a:p>
@@ -3259,7 +3260,7 @@
           <a:p>
             <a:r>
               <a:rPr lang="en-US"/>
-              <a:t>PC Project Midsem Evaluation</a:t>
+              <a:t>PC Project Evaluation</a:t>
             </a:r>
           </a:p>
         </p:txBody>
@@ -3579,7 +3580,7 @@
           <a:p>
             <a:r>
               <a:rPr lang="en-IN"/>
-              <a:t>25-Sep-19</a:t>
+              <a:t>06-Nov-19</a:t>
             </a:r>
             <a:endParaRPr lang="en-US"/>
           </a:p>
@@ -3602,7 +3603,7 @@
           <a:p>
             <a:r>
               <a:rPr lang="en-US"/>
-              <a:t>PC Project Midsem Evaluation</a:t>
+              <a:t>PC Project Evaluation</a:t>
             </a:r>
           </a:p>
         </p:txBody>
@@ -4060,7 +4061,7 @@
           <a:p>
             <a:r>
               <a:rPr lang="en-IN"/>
-              <a:t>25-Sep-19</a:t>
+              <a:t>06-Nov-19</a:t>
             </a:r>
             <a:endParaRPr lang="en-US"/>
           </a:p>
@@ -4083,7 +4084,7 @@
           <a:p>
             <a:r>
               <a:rPr lang="en-US"/>
-              <a:t>PC Project Midsem Evaluation</a:t>
+              <a:t>PC Project Evaluation</a:t>
             </a:r>
           </a:p>
         </p:txBody>
@@ -4285,7 +4286,7 @@
           <a:p>
             <a:r>
               <a:rPr lang="en-IN"/>
-              <a:t>25-Sep-19</a:t>
+              <a:t>06-Nov-19</a:t>
             </a:r>
             <a:endParaRPr lang="en-US"/>
           </a:p>
@@ -4308,7 +4309,7 @@
           <a:p>
             <a:r>
               <a:rPr lang="en-US"/>
-              <a:t>PC Project Midsem Evaluation</a:t>
+              <a:t>PC Project Evaluation</a:t>
             </a:r>
           </a:p>
         </p:txBody>
@@ -4384,7 +4385,7 @@
           <a:p>
             <a:r>
               <a:rPr lang="en-IN"/>
-              <a:t>25-Sep-19</a:t>
+              <a:t>06-Nov-19</a:t>
             </a:r>
             <a:endParaRPr lang="en-US"/>
           </a:p>
@@ -4407,7 +4408,7 @@
           <a:p>
             <a:r>
               <a:rPr lang="en-US"/>
-              <a:t>PC Project Midsem Evaluation</a:t>
+              <a:t>PC Project Evaluation</a:t>
             </a:r>
           </a:p>
         </p:txBody>
@@ -4855,7 +4856,7 @@
           <a:p>
             <a:r>
               <a:rPr lang="en-IN"/>
-              <a:t>25-Sep-19</a:t>
+              <a:t>06-Nov-19</a:t>
             </a:r>
             <a:endParaRPr lang="en-US"/>
           </a:p>
@@ -4878,7 +4879,7 @@
           <a:p>
             <a:r>
               <a:rPr lang="en-US"/>
-              <a:t>PC Project Midsem Evaluation</a:t>
+              <a:t>PC Project Evaluation</a:t>
             </a:r>
           </a:p>
         </p:txBody>
@@ -5172,7 +5173,7 @@
           <a:p>
             <a:r>
               <a:rPr lang="en-IN"/>
-              <a:t>25-Sep-19</a:t>
+              <a:t>06-Nov-19</a:t>
             </a:r>
             <a:endParaRPr lang="en-US"/>
           </a:p>
@@ -5200,7 +5201,7 @@
           <a:p>
             <a:r>
               <a:rPr lang="en-US"/>
-              <a:t>PC Project Midsem Evaluation</a:t>
+              <a:t>PC Project Evaluation</a:t>
             </a:r>
           </a:p>
         </p:txBody>
@@ -5411,7 +5412,7 @@
           <a:p>
             <a:r>
               <a:rPr lang="en-US"/>
-              <a:t>PC Project Midsem Evaluation</a:t>
+              <a:t>PC Project Evaluation</a:t>
             </a:r>
           </a:p>
         </p:txBody>
@@ -5449,7 +5450,7 @@
           <a:p>
             <a:r>
               <a:rPr lang="en-IN"/>
-              <a:t>25-Sep-19</a:t>
+              <a:t>06-Nov-19</a:t>
             </a:r>
             <a:endParaRPr lang="en-US"/>
           </a:p>
@@ -5957,7 +5958,7 @@
           <a:p>
             <a:r>
               <a:rPr lang="en-IN"/>
-              <a:t>25-Sep-19</a:t>
+              <a:t>06-Nov-19</a:t>
             </a:r>
             <a:endParaRPr lang="en-US" dirty="0"/>
           </a:p>
@@ -5985,15 +5986,7 @@
           <a:p>
             <a:r>
               <a:rPr lang="en-US" dirty="0"/>
-              <a:t>PC Project </a:t>
-            </a:r>
-            <a:r>
-              <a:rPr lang="en-US" dirty="0" err="1"/>
-              <a:t>Midsem</a:t>
-            </a:r>
-            <a:r>
-              <a:rPr lang="en-US" dirty="0"/>
-              <a:t> Evaluation</a:t>
+              <a:t>PC Project Evaluation</a:t>
             </a:r>
           </a:p>
         </p:txBody>
@@ -6174,6 +6167,161 @@
 </p:sld>
 </file>
 
+<file path=ppt/slides/slide10.xml><?xml version="1.0" encoding="utf-8"?>
+<p:sld xmlns:a="http://schemas.openxmlformats.org/drawingml/2006/main" xmlns:r="http://schemas.openxmlformats.org/officeDocument/2006/relationships" xmlns:p="http://schemas.openxmlformats.org/presentationml/2006/main">
+  <p:cSld>
+    <p:spTree>
+      <p:nvGrpSpPr>
+        <p:cNvPr id="1" name=""/>
+        <p:cNvGrpSpPr/>
+        <p:nvPr/>
+      </p:nvGrpSpPr>
+      <p:grpSpPr>
+        <a:xfrm>
+          <a:off x="0" y="0"/>
+          <a:ext cx="0" cy="0"/>
+          <a:chOff x="0" y="0"/>
+          <a:chExt cx="0" cy="0"/>
+        </a:xfrm>
+      </p:grpSpPr>
+      <p:sp>
+        <p:nvSpPr>
+          <p:cNvPr id="2" name="Title 1">
+            <a:extLst>
+              <a:ext uri="{FF2B5EF4-FFF2-40B4-BE49-F238E27FC236}">
+                <a16:creationId xmlns:a16="http://schemas.microsoft.com/office/drawing/2014/main" id="{12ED222B-6D3A-ED41-A29B-4423D5FEC704}"/>
+              </a:ext>
+            </a:extLst>
+          </p:cNvPr>
+          <p:cNvSpPr>
+            <a:spLocks noGrp="1"/>
+          </p:cNvSpPr>
+          <p:nvPr>
+            <p:ph type="title"/>
+          </p:nvPr>
+        </p:nvSpPr>
+        <p:spPr>
+          <a:xfrm>
+            <a:off x="2438400" y="2997827"/>
+            <a:ext cx="2171107" cy="862345"/>
+          </a:xfrm>
+        </p:spPr>
+        <p:txBody>
+          <a:bodyPr/>
+          <a:lstStyle/>
+          <a:p>
+            <a:r>
+              <a:rPr lang="en-US" sz="4800" dirty="0"/>
+              <a:t>THANK</a:t>
+            </a:r>
+          </a:p>
+        </p:txBody>
+      </p:sp>
+      <p:sp>
+        <p:nvSpPr>
+          <p:cNvPr id="3" name="Text Placeholder 2">
+            <a:extLst>
+              <a:ext uri="{FF2B5EF4-FFF2-40B4-BE49-F238E27FC236}">
+                <a16:creationId xmlns:a16="http://schemas.microsoft.com/office/drawing/2014/main" id="{C22E4255-22E0-2D43-88AA-D7AF2236F869}"/>
+              </a:ext>
+            </a:extLst>
+          </p:cNvPr>
+          <p:cNvSpPr>
+            <a:spLocks noGrp="1"/>
+          </p:cNvSpPr>
+          <p:nvPr>
+            <p:ph type="body" sz="quarter" idx="16"/>
+          </p:nvPr>
+        </p:nvSpPr>
+        <p:spPr>
+          <a:xfrm>
+            <a:off x="4522797" y="3023855"/>
+            <a:ext cx="1676400" cy="862345"/>
+          </a:xfrm>
+        </p:spPr>
+        <p:txBody>
+          <a:bodyPr>
+            <a:normAutofit/>
+          </a:bodyPr>
+          <a:lstStyle/>
+          <a:p>
+            <a:r>
+              <a:rPr lang="en-US" sz="4800" b="1" dirty="0"/>
+              <a:t>YOU</a:t>
+            </a:r>
+          </a:p>
+        </p:txBody>
+      </p:sp>
+      <p:sp>
+        <p:nvSpPr>
+          <p:cNvPr id="4" name="Date Placeholder 3">
+            <a:extLst>
+              <a:ext uri="{FF2B5EF4-FFF2-40B4-BE49-F238E27FC236}">
+                <a16:creationId xmlns:a16="http://schemas.microsoft.com/office/drawing/2014/main" id="{5E81CC59-F76A-0E4D-A2B4-0FEFF0AB36FC}"/>
+              </a:ext>
+            </a:extLst>
+          </p:cNvPr>
+          <p:cNvSpPr>
+            <a:spLocks noGrp="1"/>
+          </p:cNvSpPr>
+          <p:nvPr>
+            <p:ph type="dt" sz="half" idx="10"/>
+          </p:nvPr>
+        </p:nvSpPr>
+        <p:spPr/>
+        <p:txBody>
+          <a:bodyPr/>
+          <a:lstStyle/>
+          <a:p>
+            <a:r>
+              <a:rPr lang="en-IN"/>
+              <a:t>06-Nov-19</a:t>
+            </a:r>
+            <a:endParaRPr lang="en-US"/>
+          </a:p>
+        </p:txBody>
+      </p:sp>
+      <p:sp>
+        <p:nvSpPr>
+          <p:cNvPr id="5" name="Footer Placeholder 4">
+            <a:extLst>
+              <a:ext uri="{FF2B5EF4-FFF2-40B4-BE49-F238E27FC236}">
+                <a16:creationId xmlns:a16="http://schemas.microsoft.com/office/drawing/2014/main" id="{635D098D-EF33-0347-B815-43E275D4543E}"/>
+              </a:ext>
+            </a:extLst>
+          </p:cNvPr>
+          <p:cNvSpPr>
+            <a:spLocks noGrp="1"/>
+          </p:cNvSpPr>
+          <p:nvPr>
+            <p:ph type="ftr" sz="quarter" idx="11"/>
+          </p:nvPr>
+        </p:nvSpPr>
+        <p:spPr/>
+        <p:txBody>
+          <a:bodyPr/>
+          <a:lstStyle/>
+          <a:p>
+            <a:r>
+              <a:rPr lang="en-US"/>
+              <a:t>PC Project Evaluation</a:t>
+            </a:r>
+          </a:p>
+        </p:txBody>
+      </p:sp>
+    </p:spTree>
+    <p:extLst>
+      <p:ext uri="{BB962C8B-B14F-4D97-AF65-F5344CB8AC3E}">
+        <p14:creationId xmlns:p14="http://schemas.microsoft.com/office/powerpoint/2010/main" val="3775099306"/>
+      </p:ext>
+    </p:extLst>
+  </p:cSld>
+  <p:clrMapOvr>
+    <a:masterClrMapping/>
+  </p:clrMapOvr>
+</p:sld>
+</file>
+
 <file path=ppt/slides/slide2.xml><?xml version="1.0" encoding="utf-8"?>
 <p:sld xmlns:a="http://schemas.openxmlformats.org/drawingml/2006/main" xmlns:r="http://schemas.openxmlformats.org/officeDocument/2006/relationships" xmlns:p="http://schemas.openxmlformats.org/presentationml/2006/main">
   <p:cSld>
@@ -6318,7 +6466,7 @@
           <a:p>
             <a:r>
               <a:rPr lang="en-IN"/>
-              <a:t>25-Sep-19</a:t>
+              <a:t>06-Nov-19</a:t>
             </a:r>
             <a:endParaRPr lang="en-US"/>
           </a:p>
@@ -6341,7 +6489,7 @@
           <a:p>
             <a:r>
               <a:rPr lang="en-US"/>
-              <a:t>PC Project Midsem Evaluation</a:t>
+              <a:t>PC Project Evaluation</a:t>
             </a:r>
           </a:p>
         </p:txBody>
@@ -6424,33 +6572,10 @@
           <a:p>
             <a:pPr algn="just"/>
             <a:r>
-              <a:rPr lang="en-US" dirty="0"/>
-              <a:t>The combination of neural networks with Decision Trees known as DJINN demonstrate high predictive performance for a variety of regression and classification data sets and display comparable performance to Bayesian hyperparameter optimization at a lower computational cost and in a flexible and scalable manner. We propose to </a:t>
-            </a:r>
-            <a:r>
-              <a:rPr lang="en-US" dirty="0" err="1"/>
-              <a:t>parallelise</a:t>
-            </a:r>
-            <a:r>
-              <a:rPr lang="en-US" dirty="0"/>
-              <a:t> the above stated problem by using OpenMP and hence </a:t>
-            </a:r>
-            <a:r>
-              <a:rPr lang="en-US" dirty="0" err="1"/>
-              <a:t>utilising</a:t>
-            </a:r>
-            <a:r>
-              <a:rPr lang="en-US" dirty="0"/>
-              <a:t> all available resources and saving on </a:t>
-            </a:r>
-            <a:r>
-              <a:rPr lang="en-US" dirty="0" err="1"/>
-              <a:t>initialisation</a:t>
-            </a:r>
-            <a:r>
-              <a:rPr lang="en-US" dirty="0"/>
-              <a:t> time of the model.  The tree-informed initialization thus acts as a warm-start to the neural network training process, resulting in efficiently trained, quick and accurate networks.</a:t>
-            </a:r>
+              <a:rPr lang="en-IN" dirty="0"/>
+              <a:t>The combination of neural networks with Decision Trees known as DJINN demonstrate high predictive performance for a variety of regression and classification data sets and display comparable performance to Bayesian hyperparameter optimization at a lower computational cost and in a flexible and scalable manner. We propose to parallelise the above-stated problem by using various language specific parallelization constructs and hence utilising all available resources and saving on initialisation time of the model.  The tree-informed initialization thus acts as a warm-start to the neural network training process, resulting in efficiently trained, quick and accurate networks.</a:t>
+            </a:r>
+            <a:endParaRPr lang="en-US" dirty="0"/>
           </a:p>
         </p:txBody>
       </p:sp>
@@ -6471,7 +6596,7 @@
           <a:p>
             <a:r>
               <a:rPr lang="en-IN"/>
-              <a:t>25-Sep-19</a:t>
+              <a:t>06-Nov-19</a:t>
             </a:r>
             <a:endParaRPr lang="en-US"/>
           </a:p>
@@ -6494,7 +6619,7 @@
           <a:p>
             <a:r>
               <a:rPr lang="en-US"/>
-              <a:t>PC Project Midsem Evaluation</a:t>
+              <a:t>PC Project Evaluation</a:t>
             </a:r>
           </a:p>
         </p:txBody>
@@ -6569,7 +6694,7 @@
         <p:spPr/>
         <p:txBody>
           <a:bodyPr>
-            <a:normAutofit/>
+            <a:normAutofit lnSpcReduction="10000"/>
           </a:bodyPr>
           <a:lstStyle/>
           <a:p>
@@ -6586,9 +6711,10 @@
           </a:p>
           <a:p>
             <a:r>
-              <a:rPr lang="en-US" dirty="0"/>
-              <a:t>We thus wish to harness the advantages of this technique, but without the banes that come with it using the concepts of Parallel computing using OpenMP</a:t>
-            </a:r>
+              <a:rPr lang="en-IN" dirty="0"/>
+              <a:t>We thus looked to eliminate this huge time factor that may prevent the industry from taking advantage of DJINNs, to utilize maximum capacity of the processors and memory devices which is mainly done through the concepts of parallel computing.</a:t>
+            </a:r>
+            <a:endParaRPr lang="en-US" dirty="0"/>
           </a:p>
         </p:txBody>
       </p:sp>
@@ -6609,7 +6735,7 @@
           <a:p>
             <a:r>
               <a:rPr lang="en-IN"/>
-              <a:t>25-Sep-19</a:t>
+              <a:t>06-Nov-19</a:t>
             </a:r>
             <a:endParaRPr lang="en-US"/>
           </a:p>
@@ -6632,7 +6758,7 @@
           <a:p>
             <a:r>
               <a:rPr lang="en-US"/>
-              <a:t>PC Project Midsem Evaluation</a:t>
+              <a:t>PC Project Evaluation</a:t>
             </a:r>
           </a:p>
         </p:txBody>
@@ -6712,7 +6838,7 @@
           <a:p>
             <a:r>
               <a:rPr lang="en-IN"/>
-              <a:t>25-Sep-19</a:t>
+              <a:t>06-Nov-19</a:t>
             </a:r>
             <a:endParaRPr lang="en-US"/>
           </a:p>
@@ -6735,7 +6861,7 @@
           <a:p>
             <a:r>
               <a:rPr lang="en-US"/>
-              <a:t>PC Project Midsem Evaluation</a:t>
+              <a:t>PC Project Evaluation</a:t>
             </a:r>
           </a:p>
         </p:txBody>
@@ -6758,7 +6884,9 @@
         </p:nvSpPr>
         <p:spPr/>
         <p:txBody>
-          <a:bodyPr/>
+          <a:bodyPr>
+            <a:normAutofit/>
+          </a:bodyPr>
           <a:lstStyle/>
           <a:p>
             <a:pPr marL="0" indent="0">
@@ -6786,17 +6914,23 @@
             </a:pPr>
             <a:r>
               <a:rPr lang="en-US" dirty="0"/>
-              <a:t>Next, we look for sections of the code which can be optimized using the concepts of parallel computing.</a:t>
-            </a:r>
-          </a:p>
-          <a:p>
-            <a:pPr>
-              <a:buFont typeface="+mj-lt"/>
-              <a:buAutoNum type="arabicPeriod"/>
-            </a:pPr>
+              <a:t>Referencing the implementation of the </a:t>
+            </a:r>
+            <a:r>
+              <a:rPr lang="en-US" dirty="0" err="1"/>
+              <a:t>PyMP</a:t>
+            </a:r>
             <a:r>
               <a:rPr lang="en-US" dirty="0"/>
-              <a:t>Referencing the implementation of the OpenMP library to identify and use suitable constructs in the appropriate places and test if they improve the performance.</a:t>
+              <a:t>, Ray, </a:t>
+            </a:r>
+            <a:r>
+              <a:rPr lang="en-US" dirty="0" err="1"/>
+              <a:t>Concurrent.Futures</a:t>
+            </a:r>
+            <a:r>
+              <a:rPr lang="en-US" dirty="0"/>
+              <a:t>, etc. library to identify and use suitable constructs in the appropriate places and test if they improve the performance.</a:t>
             </a:r>
           </a:p>
           <a:p>
@@ -6848,24 +6982,76 @@
         </p:nvSpPr>
         <p:spPr>
           <a:xfrm>
-            <a:off x="2209800" y="267365"/>
-            <a:ext cx="4371603" cy="731838"/>
+            <a:off x="2114541" y="703017"/>
+            <a:ext cx="4600203" cy="970450"/>
           </a:xfrm>
         </p:spPr>
         <p:txBody>
           <a:bodyPr/>
           <a:lstStyle/>
           <a:p>
-            <a:r>
-              <a:rPr lang="en-US" dirty="0"/>
-              <a:t>Expected Results</a:t>
-            </a:r>
-          </a:p>
-        </p:txBody>
-      </p:sp>
-      <p:sp>
-        <p:nvSpPr>
-          <p:cNvPr id="3" name="Content Placeholder 2"/>
+            <a:pPr algn="ctr"/>
+            <a:r>
+              <a:rPr lang="en-US" b="1" dirty="0"/>
+              <a:t>Implementation Strategy (contd.)</a:t>
+            </a:r>
+          </a:p>
+        </p:txBody>
+      </p:sp>
+      <p:sp>
+        <p:nvSpPr>
+          <p:cNvPr id="4" name="Date Placeholder 3"/>
+          <p:cNvSpPr>
+            <a:spLocks noGrp="1"/>
+          </p:cNvSpPr>
+          <p:nvPr>
+            <p:ph type="dt" sz="half" idx="10"/>
+          </p:nvPr>
+        </p:nvSpPr>
+        <p:spPr/>
+        <p:txBody>
+          <a:bodyPr/>
+          <a:lstStyle/>
+          <a:p>
+            <a:r>
+              <a:rPr lang="en-IN"/>
+              <a:t>06-Nov-19</a:t>
+            </a:r>
+            <a:endParaRPr lang="en-US"/>
+          </a:p>
+        </p:txBody>
+      </p:sp>
+      <p:sp>
+        <p:nvSpPr>
+          <p:cNvPr id="5" name="Footer Placeholder 4"/>
+          <p:cNvSpPr>
+            <a:spLocks noGrp="1"/>
+          </p:cNvSpPr>
+          <p:nvPr>
+            <p:ph type="ftr" sz="quarter" idx="11"/>
+          </p:nvPr>
+        </p:nvSpPr>
+        <p:spPr/>
+        <p:txBody>
+          <a:bodyPr/>
+          <a:lstStyle/>
+          <a:p>
+            <a:r>
+              <a:rPr lang="en-US"/>
+              <a:t>PC Project Evaluation</a:t>
+            </a:r>
+          </a:p>
+        </p:txBody>
+      </p:sp>
+      <p:sp>
+        <p:nvSpPr>
+          <p:cNvPr id="7" name="Content Placeholder 6">
+            <a:extLst>
+              <a:ext uri="{FF2B5EF4-FFF2-40B4-BE49-F238E27FC236}">
+                <a16:creationId xmlns:a16="http://schemas.microsoft.com/office/drawing/2014/main" id="{4D472428-BC52-804B-930F-B39ECF9BE590}"/>
+              </a:ext>
+            </a:extLst>
+          </p:cNvPr>
           <p:cNvSpPr>
             <a:spLocks noGrp="1"/>
           </p:cNvSpPr>
@@ -6875,84 +7061,67 @@
         </p:nvSpPr>
         <p:spPr>
           <a:xfrm>
-            <a:off x="809998" y="2133600"/>
-            <a:ext cx="7524003" cy="3636510"/>
+            <a:off x="809997" y="2222287"/>
+            <a:ext cx="7524003" cy="3819074"/>
           </a:xfrm>
         </p:spPr>
         <p:txBody>
-          <a:bodyPr/>
-          <a:lstStyle/>
-          <a:p>
-            <a:r>
-              <a:rPr lang="en-US" dirty="0"/>
-              <a:t>Using OpenMP to address the high initialization time, we expect to achieve lesser computational time for the same.</a:t>
-            </a:r>
-          </a:p>
-          <a:p>
+          <a:bodyPr>
+            <a:normAutofit fontScale="92500" lnSpcReduction="20000"/>
+          </a:bodyPr>
+          <a:lstStyle/>
+          <a:p>
+            <a:pPr fontAlgn="base"/>
+            <a:r>
+              <a:rPr lang="en-IN" dirty="0"/>
+              <a:t>In the low level execution of the code, we have attempted to parallelize the running of various methods that are used during the training of the model. This has mainly been achieved by the use of Ray, which implicitly runs the implied method concurrently when called using `@</a:t>
+            </a:r>
+            <a:r>
+              <a:rPr lang="en-IN" dirty="0" err="1"/>
+              <a:t>ray.remote</a:t>
+            </a:r>
+            <a:r>
+              <a:rPr lang="en-IN" dirty="0"/>
+              <a:t>`</a:t>
+            </a:r>
+          </a:p>
+          <a:p>
+            <a:pPr fontAlgn="base"/>
+            <a:r>
+              <a:rPr lang="en-IN" dirty="0"/>
+              <a:t>In the calling of the functions during the training and fitting of our DJINN Classifier and Regressor, we have parallelized by the use of </a:t>
+            </a:r>
+            <a:r>
+              <a:rPr lang="en-IN" dirty="0" err="1"/>
+              <a:t>PyMP</a:t>
+            </a:r>
+            <a:r>
+              <a:rPr lang="en-IN" dirty="0"/>
+              <a:t>  </a:t>
+            </a:r>
+          </a:p>
+          <a:p>
+            <a:pPr fontAlgn="base"/>
+            <a:r>
+              <a:rPr lang="en-IN" dirty="0"/>
+              <a:t>When the training of one of the models is going on, we are also attempting to run the other model of Bayesian classifier in parallel, hence reducing the waiting time, and increasing efficiency</a:t>
+            </a:r>
+          </a:p>
+          <a:p>
+            <a:r>
+              <a:rPr lang="en-IN" dirty="0"/>
+              <a:t>With all these improvements in the code and use of resources, we have been able to achieve superior performance gain and efficient utilization of resources when running a DJINN model to train a network.</a:t>
+            </a:r>
             <a:endParaRPr lang="en-US" dirty="0"/>
           </a:p>
-          <a:p>
-            <a:r>
-              <a:rPr lang="en-US" dirty="0"/>
-              <a:t>Apart from that, we hope to harness maximum computational efficiency from the modern day machine which relies on multiple cores for its power.</a:t>
-            </a:r>
-          </a:p>
-        </p:txBody>
-      </p:sp>
-      <p:sp>
-        <p:nvSpPr>
-          <p:cNvPr id="4" name="Date Placeholder 3"/>
-          <p:cNvSpPr>
-            <a:spLocks noGrp="1"/>
-          </p:cNvSpPr>
-          <p:nvPr>
-            <p:ph type="dt" sz="half" idx="10"/>
-          </p:nvPr>
-        </p:nvSpPr>
-        <p:spPr/>
-        <p:txBody>
-          <a:bodyPr/>
-          <a:lstStyle/>
-          <a:p>
-            <a:r>
-              <a:rPr lang="en-IN"/>
-              <a:t>25-Sep-19</a:t>
-            </a:r>
-            <a:endParaRPr lang="en-US"/>
-          </a:p>
-        </p:txBody>
-      </p:sp>
-      <p:sp>
-        <p:nvSpPr>
-          <p:cNvPr id="5" name="Footer Placeholder 4"/>
-          <p:cNvSpPr>
-            <a:spLocks noGrp="1"/>
-          </p:cNvSpPr>
-          <p:nvPr>
-            <p:ph type="ftr" sz="quarter" idx="11"/>
-          </p:nvPr>
-        </p:nvSpPr>
-        <p:spPr/>
-        <p:txBody>
-          <a:bodyPr/>
-          <a:lstStyle/>
-          <a:p>
-            <a:r>
-              <a:rPr lang="en-US" dirty="0"/>
-              <a:t>PC Project </a:t>
-            </a:r>
-            <a:r>
-              <a:rPr lang="en-US" dirty="0" err="1"/>
-              <a:t>Midsem</a:t>
-            </a:r>
-            <a:r>
-              <a:rPr lang="en-US" dirty="0"/>
-              <a:t> Evaluation</a:t>
-            </a:r>
-          </a:p>
         </p:txBody>
       </p:sp>
     </p:spTree>
+    <p:extLst>
+      <p:ext uri="{BB962C8B-B14F-4D97-AF65-F5344CB8AC3E}">
+        <p14:creationId xmlns:p14="http://schemas.microsoft.com/office/powerpoint/2010/main" val="26865590"/>
+      </p:ext>
+    </p:extLst>
   </p:cSld>
   <p:clrMapOvr>
     <a:masterClrMapping/>
@@ -6989,18 +7158,17 @@
         </p:nvSpPr>
         <p:spPr>
           <a:xfrm>
-            <a:off x="2438400" y="-157834"/>
-            <a:ext cx="3884982" cy="1136522"/>
+            <a:off x="2209800" y="267365"/>
+            <a:ext cx="4419600" cy="731838"/>
           </a:xfrm>
         </p:spPr>
         <p:txBody>
           <a:bodyPr/>
           <a:lstStyle/>
           <a:p>
-            <a:pPr algn="ctr"/>
             <a:r>
               <a:rPr lang="en-US" dirty="0"/>
-              <a:t>Timeline Plan</a:t>
+              <a:t>Results Achieved</a:t>
             </a:r>
           </a:p>
         </p:txBody>
@@ -7017,80 +7185,58 @@
         </p:nvSpPr>
         <p:spPr>
           <a:xfrm>
-            <a:off x="809997" y="2222286"/>
-            <a:ext cx="7524003" cy="4330913"/>
+            <a:off x="809998" y="2133600"/>
+            <a:ext cx="7524003" cy="3636510"/>
           </a:xfrm>
         </p:spPr>
         <p:txBody>
-          <a:bodyPr>
-            <a:normAutofit/>
-          </a:bodyPr>
-          <a:lstStyle/>
-          <a:p>
-            <a:r>
-              <a:rPr lang="en-US" dirty="0"/>
-              <a:t>25</a:t>
-            </a:r>
-            <a:r>
-              <a:rPr lang="en-US" baseline="30000" dirty="0"/>
-              <a:t>th</a:t>
-            </a:r>
-            <a:r>
-              <a:rPr lang="en-US" dirty="0"/>
-              <a:t> September: Project Proposal and Presentation.</a:t>
-            </a:r>
-          </a:p>
-          <a:p>
-            <a:r>
-              <a:rPr lang="en-US" dirty="0"/>
-              <a:t>2</a:t>
-            </a:r>
-            <a:r>
-              <a:rPr lang="en-US" baseline="30000" dirty="0"/>
-              <a:t>nd</a:t>
-            </a:r>
-            <a:r>
-              <a:rPr lang="en-US" dirty="0"/>
-              <a:t> Week October: Implementation of the DJINN on standard dataset</a:t>
-            </a:r>
-          </a:p>
-          <a:p>
-            <a:r>
-              <a:rPr lang="en-US" dirty="0"/>
-              <a:t>3</a:t>
-            </a:r>
-            <a:r>
-              <a:rPr lang="en-US" baseline="30000" dirty="0"/>
-              <a:t>rd</a:t>
-            </a:r>
-            <a:r>
-              <a:rPr lang="en-US" dirty="0"/>
-              <a:t> Week October: Understanding the low level implementation of the code and identifying the sections which can be parallelized.</a:t>
-            </a:r>
-          </a:p>
-          <a:p>
-            <a:r>
-              <a:rPr lang="en-US" dirty="0"/>
-              <a:t>4</a:t>
-            </a:r>
-            <a:r>
-              <a:rPr lang="en-US" baseline="30000" dirty="0"/>
-              <a:t>th</a:t>
-            </a:r>
-            <a:r>
-              <a:rPr lang="en-US" dirty="0"/>
-              <a:t> Week October: Implementing OpenMP construct to parallelize the code.</a:t>
-            </a:r>
-          </a:p>
-          <a:p>
-            <a:r>
-              <a:rPr lang="en-US" dirty="0"/>
-              <a:t>October End: Evaluating the performance improvement of the parallelized code against the serial code and making the report.</a:t>
-            </a:r>
-          </a:p>
-          <a:p>
+          <a:bodyPr/>
+          <a:lstStyle/>
+          <a:p>
+            <a:pPr fontAlgn="base"/>
+            <a:r>
+              <a:rPr lang="en-IN" dirty="0"/>
+              <a:t>Using </a:t>
+            </a:r>
+            <a:r>
+              <a:rPr lang="en-IN" dirty="0" err="1"/>
+              <a:t>Concurrent.Futures</a:t>
+            </a:r>
+            <a:r>
+              <a:rPr lang="en-IN" dirty="0"/>
+              <a:t> Library, we have been able to train and run two independent models </a:t>
+            </a:r>
+            <a:r>
+              <a:rPr lang="en-IN" dirty="0" err="1"/>
+              <a:t>parallely</a:t>
+            </a:r>
+            <a:r>
+              <a:rPr lang="en-IN" dirty="0"/>
+              <a:t>, thus giving our computation a major boost.</a:t>
+            </a:r>
+          </a:p>
+          <a:p>
+            <a:r>
+              <a:rPr lang="en-IN" dirty="0"/>
+              <a:t>Using Ray and </a:t>
+            </a:r>
+            <a:r>
+              <a:rPr lang="en-IN" dirty="0" err="1"/>
+              <a:t>PyMP</a:t>
+            </a:r>
+            <a:r>
+              <a:rPr lang="en-IN" dirty="0"/>
+              <a:t>, We have been able to parallelise various functions that are critical to the functioning of the application, thus cutting down computation time at various minor stages.</a:t>
+            </a:r>
             <a:endParaRPr lang="en-US" dirty="0"/>
           </a:p>
+          <a:p>
+            <a:r>
+              <a:rPr lang="en-IN" dirty="0"/>
+              <a:t>Apart from that, we have been able to harness maximum computational efficiency from the modern day machine which relies on multiple cores for its power by keeping all its cores busy at all times during the program execution.</a:t>
+            </a:r>
+            <a:endParaRPr lang="en-US" dirty="0"/>
+          </a:p>
         </p:txBody>
       </p:sp>
       <p:sp>
@@ -7110,7 +7256,7 @@
           <a:p>
             <a:r>
               <a:rPr lang="en-IN"/>
-              <a:t>25-Sep-19</a:t>
+              <a:t>06-Nov-19</a:t>
             </a:r>
             <a:endParaRPr lang="en-US"/>
           </a:p>
@@ -7133,8 +7279,9 @@
           <a:p>
             <a:r>
               <a:rPr lang="en-US"/>
-              <a:t>PC Project Midsem Evaluation</a:t>
-            </a:r>
+              <a:t>PC Project Evaluation</a:t>
+            </a:r>
+            <a:endParaRPr lang="en-US" dirty="0"/>
           </a:p>
         </p:txBody>
       </p:sp>
@@ -7175,8 +7322,8 @@
         </p:nvSpPr>
         <p:spPr>
           <a:xfrm>
-            <a:off x="1524000" y="92376"/>
-            <a:ext cx="7524003" cy="924412"/>
+            <a:off x="2209800" y="267365"/>
+            <a:ext cx="4419600" cy="731838"/>
           </a:xfrm>
         </p:spPr>
         <p:txBody>
@@ -7185,7 +7332,7 @@
           <a:p>
             <a:r>
               <a:rPr lang="en-US" dirty="0"/>
-              <a:t>Team Load Distribution:</a:t>
+              <a:t>Results Achieved</a:t>
             </a:r>
           </a:p>
         </p:txBody>
@@ -7202,123 +7349,114 @@
         </p:nvSpPr>
         <p:spPr>
           <a:xfrm>
-            <a:off x="809998" y="2587413"/>
-            <a:ext cx="7524003" cy="3636510"/>
+            <a:off x="809996" y="2422526"/>
+            <a:ext cx="7524003" cy="365125"/>
           </a:xfrm>
         </p:spPr>
         <p:txBody>
+          <a:bodyPr>
+            <a:normAutofit lnSpcReduction="10000"/>
+          </a:bodyPr>
+          <a:lstStyle/>
+          <a:p>
+            <a:pPr marL="0" indent="0">
+              <a:buNone/>
+            </a:pPr>
+            <a:r>
+              <a:rPr lang="en-IN" dirty="0"/>
+              <a:t>To measure our results quantitatively (comparison): </a:t>
+            </a:r>
+          </a:p>
+        </p:txBody>
+      </p:sp>
+      <p:sp>
+        <p:nvSpPr>
+          <p:cNvPr id="4" name="Date Placeholder 3"/>
+          <p:cNvSpPr>
+            <a:spLocks noGrp="1"/>
+          </p:cNvSpPr>
+          <p:nvPr>
+            <p:ph type="dt" sz="half" idx="10"/>
+          </p:nvPr>
+        </p:nvSpPr>
+        <p:spPr/>
+        <p:txBody>
           <a:bodyPr/>
           <a:lstStyle/>
           <a:p>
             <a:r>
-              <a:rPr lang="en-US" dirty="0"/>
-              <a:t>Team Member 1:</a:t>
-            </a:r>
-          </a:p>
-          <a:p>
-            <a:pPr lvl="1"/>
-            <a:r>
-              <a:rPr lang="en-US" dirty="0"/>
-              <a:t>Implementation of DJINN and Decision Trees</a:t>
-            </a:r>
-          </a:p>
-          <a:p>
-            <a:pPr lvl="1"/>
-            <a:r>
-              <a:rPr lang="en-US" dirty="0"/>
-              <a:t>Identifying sections in the code which can be potentially parallelized</a:t>
-            </a:r>
-          </a:p>
-          <a:p>
-            <a:pPr lvl="1"/>
-            <a:r>
-              <a:rPr lang="en-US" dirty="0"/>
-              <a:t>Implementing OpenMP constructs to optimize the code.</a:t>
-            </a:r>
-          </a:p>
-          <a:p>
-            <a:r>
-              <a:rPr lang="en-US" dirty="0"/>
-              <a:t>Team Member 2:</a:t>
-            </a:r>
-          </a:p>
-          <a:p>
-            <a:pPr lvl="1"/>
-            <a:r>
-              <a:rPr lang="en-US" dirty="0"/>
-              <a:t>Implementation of DJINN and Decision Trees</a:t>
-            </a:r>
-          </a:p>
-          <a:p>
-            <a:pPr lvl="1"/>
-            <a:r>
-              <a:rPr lang="en-US" dirty="0"/>
-              <a:t>Implementing OpenMP constructs to optimize the code.</a:t>
-            </a:r>
-          </a:p>
-          <a:p>
-            <a:pPr lvl="1"/>
-            <a:r>
-              <a:rPr lang="en-US" dirty="0"/>
-              <a:t>Evaluating Performance Gain, Speedup, Efficiency against the serial code.</a:t>
-            </a:r>
-          </a:p>
-          <a:p>
-            <a:pPr lvl="1"/>
+              <a:rPr lang="en-IN"/>
+              <a:t>06-Nov-19</a:t>
+            </a:r>
+            <a:endParaRPr lang="en-US"/>
+          </a:p>
+        </p:txBody>
+      </p:sp>
+      <p:sp>
+        <p:nvSpPr>
+          <p:cNvPr id="5" name="Footer Placeholder 4"/>
+          <p:cNvSpPr>
+            <a:spLocks noGrp="1"/>
+          </p:cNvSpPr>
+          <p:nvPr>
+            <p:ph type="ftr" sz="quarter" idx="11"/>
+          </p:nvPr>
+        </p:nvSpPr>
+        <p:spPr/>
+        <p:txBody>
+          <a:bodyPr/>
+          <a:lstStyle/>
+          <a:p>
+            <a:r>
+              <a:rPr lang="en-US"/>
+              <a:t>PC Project Evaluation</a:t>
+            </a:r>
             <a:endParaRPr lang="en-US" dirty="0"/>
           </a:p>
-          <a:p>
-            <a:pPr lvl="1"/>
-            <a:endParaRPr lang="en-US" dirty="0"/>
-          </a:p>
-        </p:txBody>
-      </p:sp>
-      <p:sp>
-        <p:nvSpPr>
-          <p:cNvPr id="4" name="Date Placeholder 3"/>
-          <p:cNvSpPr>
-            <a:spLocks noGrp="1"/>
-          </p:cNvSpPr>
-          <p:nvPr>
-            <p:ph type="dt" sz="half" idx="10"/>
-          </p:nvPr>
-        </p:nvSpPr>
-        <p:spPr/>
-        <p:txBody>
-          <a:bodyPr/>
-          <a:lstStyle/>
-          <a:p>
-            <a:r>
-              <a:rPr lang="en-IN"/>
-              <a:t>25-Sep-19</a:t>
-            </a:r>
-            <a:endParaRPr lang="en-US"/>
-          </a:p>
-        </p:txBody>
-      </p:sp>
-      <p:sp>
-        <p:nvSpPr>
-          <p:cNvPr id="5" name="Footer Placeholder 4"/>
-          <p:cNvSpPr>
-            <a:spLocks noGrp="1"/>
-          </p:cNvSpPr>
-          <p:nvPr>
-            <p:ph type="ftr" sz="quarter" idx="11"/>
-          </p:nvPr>
-        </p:nvSpPr>
-        <p:spPr/>
-        <p:txBody>
-          <a:bodyPr/>
-          <a:lstStyle/>
-          <a:p>
-            <a:r>
-              <a:rPr lang="en-US"/>
-              <a:t>PC Project Midsem Evaluation</a:t>
-            </a:r>
-          </a:p>
-        </p:txBody>
-      </p:sp>
+        </p:txBody>
+      </p:sp>
+      <p:pic>
+        <p:nvPicPr>
+          <p:cNvPr id="9" name="Picture 8">
+            <a:extLst>
+              <a:ext uri="{FF2B5EF4-FFF2-40B4-BE49-F238E27FC236}">
+                <a16:creationId xmlns:a16="http://schemas.microsoft.com/office/drawing/2014/main" id="{A9665275-DBAD-9D4A-BBC4-0A36CFBD9CD9}"/>
+              </a:ext>
+            </a:extLst>
+          </p:cNvPr>
+          <p:cNvPicPr>
+            <a:picLocks noChangeAspect="1"/>
+          </p:cNvPicPr>
+          <p:nvPr/>
+        </p:nvPicPr>
+        <p:blipFill>
+          <a:blip r:embed="rId2">
+            <a:extLst>
+              <a:ext uri="{28A0092B-C50C-407E-A947-70E740481C1C}">
+                <a14:useLocalDpi xmlns:a14="http://schemas.microsoft.com/office/drawing/2010/main" val="0"/>
+              </a:ext>
+            </a:extLst>
+          </a:blip>
+          <a:stretch>
+            <a:fillRect/>
+          </a:stretch>
+        </p:blipFill>
+        <p:spPr>
+          <a:xfrm>
+            <a:off x="406517" y="3217390"/>
+            <a:ext cx="8330963" cy="2061764"/>
+          </a:xfrm>
+          <a:prstGeom prst="rect">
+            <a:avLst/>
+          </a:prstGeom>
+        </p:spPr>
+      </p:pic>
     </p:spTree>
+    <p:extLst>
+      <p:ext uri="{BB962C8B-B14F-4D97-AF65-F5344CB8AC3E}">
+        <p14:creationId xmlns:p14="http://schemas.microsoft.com/office/powerpoint/2010/main" val="3374211267"/>
+      </p:ext>
+    </p:extLst>
   </p:cSld>
   <p:clrMapOvr>
     <a:masterClrMapping/>
@@ -7345,133 +7483,149 @@
       </p:grpSpPr>
       <p:sp>
         <p:nvSpPr>
-          <p:cNvPr id="2" name="Title 1">
+          <p:cNvPr id="2" name="Title 1"/>
+          <p:cNvSpPr>
+            <a:spLocks noGrp="1"/>
+          </p:cNvSpPr>
+          <p:nvPr>
+            <p:ph type="title"/>
+          </p:nvPr>
+        </p:nvSpPr>
+        <p:spPr>
+          <a:xfrm>
+            <a:off x="2209800" y="267365"/>
+            <a:ext cx="4419600" cy="731838"/>
+          </a:xfrm>
+        </p:spPr>
+        <p:txBody>
+          <a:bodyPr/>
+          <a:lstStyle/>
+          <a:p>
+            <a:r>
+              <a:rPr lang="en-US" dirty="0"/>
+              <a:t>Results Achieved</a:t>
+            </a:r>
+          </a:p>
+        </p:txBody>
+      </p:sp>
+      <p:sp>
+        <p:nvSpPr>
+          <p:cNvPr id="3" name="Content Placeholder 2"/>
+          <p:cNvSpPr>
+            <a:spLocks noGrp="1"/>
+          </p:cNvSpPr>
+          <p:nvPr>
+            <p:ph idx="1"/>
+          </p:nvPr>
+        </p:nvSpPr>
+        <p:spPr>
+          <a:xfrm>
+            <a:off x="809996" y="2422526"/>
+            <a:ext cx="7524003" cy="365125"/>
+          </a:xfrm>
+        </p:spPr>
+        <p:txBody>
+          <a:bodyPr>
+            <a:normAutofit lnSpcReduction="10000"/>
+          </a:bodyPr>
+          <a:lstStyle/>
+          <a:p>
+            <a:pPr marL="0" indent="0">
+              <a:buNone/>
+            </a:pPr>
+            <a:r>
+              <a:rPr lang="en-IN" dirty="0"/>
+              <a:t>To measure our results quantitatively (speed-up): </a:t>
+            </a:r>
+          </a:p>
+        </p:txBody>
+      </p:sp>
+      <p:sp>
+        <p:nvSpPr>
+          <p:cNvPr id="4" name="Date Placeholder 3"/>
+          <p:cNvSpPr>
+            <a:spLocks noGrp="1"/>
+          </p:cNvSpPr>
+          <p:nvPr>
+            <p:ph type="dt" sz="half" idx="10"/>
+          </p:nvPr>
+        </p:nvSpPr>
+        <p:spPr/>
+        <p:txBody>
+          <a:bodyPr/>
+          <a:lstStyle/>
+          <a:p>
+            <a:r>
+              <a:rPr lang="en-IN"/>
+              <a:t>06-Nov-19</a:t>
+            </a:r>
+            <a:endParaRPr lang="en-US"/>
+          </a:p>
+        </p:txBody>
+      </p:sp>
+      <p:sp>
+        <p:nvSpPr>
+          <p:cNvPr id="5" name="Footer Placeholder 4"/>
+          <p:cNvSpPr>
+            <a:spLocks noGrp="1"/>
+          </p:cNvSpPr>
+          <p:nvPr>
+            <p:ph type="ftr" sz="quarter" idx="11"/>
+          </p:nvPr>
+        </p:nvSpPr>
+        <p:spPr/>
+        <p:txBody>
+          <a:bodyPr/>
+          <a:lstStyle/>
+          <a:p>
+            <a:r>
+              <a:rPr lang="en-US"/>
+              <a:t>PC Project Evaluation</a:t>
+            </a:r>
+            <a:endParaRPr lang="en-US" dirty="0"/>
+          </a:p>
+        </p:txBody>
+      </p:sp>
+      <p:pic>
+        <p:nvPicPr>
+          <p:cNvPr id="7" name="Picture 6">
             <a:extLst>
               <a:ext uri="{FF2B5EF4-FFF2-40B4-BE49-F238E27FC236}">
-                <a16:creationId xmlns:a16="http://schemas.microsoft.com/office/drawing/2014/main" id="{12ED222B-6D3A-ED41-A29B-4423D5FEC704}"/>
+                <a16:creationId xmlns:a16="http://schemas.microsoft.com/office/drawing/2014/main" id="{87384C63-4564-7143-9B2D-90324CBE7C03}"/>
               </a:ext>
             </a:extLst>
           </p:cNvPr>
-          <p:cNvSpPr>
-            <a:spLocks noGrp="1"/>
-          </p:cNvSpPr>
-          <p:nvPr>
-            <p:ph type="title"/>
-          </p:nvPr>
-        </p:nvSpPr>
+          <p:cNvPicPr>
+            <a:picLocks noChangeAspect="1"/>
+          </p:cNvPicPr>
+          <p:nvPr/>
+        </p:nvPicPr>
+        <p:blipFill>
+          <a:blip r:embed="rId2">
+            <a:extLst>
+              <a:ext uri="{28A0092B-C50C-407E-A947-70E740481C1C}">
+                <a14:useLocalDpi xmlns:a14="http://schemas.microsoft.com/office/drawing/2010/main" val="0"/>
+              </a:ext>
+            </a:extLst>
+          </a:blip>
+          <a:stretch>
+            <a:fillRect/>
+          </a:stretch>
+        </p:blipFill>
         <p:spPr>
           <a:xfrm>
-            <a:off x="2438400" y="2997827"/>
-            <a:ext cx="2171107" cy="862345"/>
+            <a:off x="403707" y="3217132"/>
+            <a:ext cx="8334004" cy="2071561"/>
           </a:xfrm>
+          <a:prstGeom prst="rect">
+            <a:avLst/>
+          </a:prstGeom>
         </p:spPr>
-        <p:txBody>
-          <a:bodyPr/>
-          <a:lstStyle/>
-          <a:p>
-            <a:r>
-              <a:rPr lang="en-US" sz="4800" dirty="0"/>
-              <a:t>THANK</a:t>
-            </a:r>
-          </a:p>
-        </p:txBody>
-      </p:sp>
-      <p:sp>
-        <p:nvSpPr>
-          <p:cNvPr id="3" name="Text Placeholder 2">
-            <a:extLst>
-              <a:ext uri="{FF2B5EF4-FFF2-40B4-BE49-F238E27FC236}">
-                <a16:creationId xmlns:a16="http://schemas.microsoft.com/office/drawing/2014/main" id="{C22E4255-22E0-2D43-88AA-D7AF2236F869}"/>
-              </a:ext>
-            </a:extLst>
-          </p:cNvPr>
-          <p:cNvSpPr>
-            <a:spLocks noGrp="1"/>
-          </p:cNvSpPr>
-          <p:nvPr>
-            <p:ph type="body" sz="quarter" idx="16"/>
-          </p:nvPr>
-        </p:nvSpPr>
-        <p:spPr>
-          <a:xfrm>
-            <a:off x="4522797" y="3023855"/>
-            <a:ext cx="1676400" cy="862345"/>
-          </a:xfrm>
-        </p:spPr>
-        <p:txBody>
-          <a:bodyPr>
-            <a:normAutofit/>
-          </a:bodyPr>
-          <a:lstStyle/>
-          <a:p>
-            <a:r>
-              <a:rPr lang="en-US" sz="4800" b="1" dirty="0"/>
-              <a:t>YOU</a:t>
-            </a:r>
-          </a:p>
-        </p:txBody>
-      </p:sp>
-      <p:sp>
-        <p:nvSpPr>
-          <p:cNvPr id="4" name="Date Placeholder 3">
-            <a:extLst>
-              <a:ext uri="{FF2B5EF4-FFF2-40B4-BE49-F238E27FC236}">
-                <a16:creationId xmlns:a16="http://schemas.microsoft.com/office/drawing/2014/main" id="{5E81CC59-F76A-0E4D-A2B4-0FEFF0AB36FC}"/>
-              </a:ext>
-            </a:extLst>
-          </p:cNvPr>
-          <p:cNvSpPr>
-            <a:spLocks noGrp="1"/>
-          </p:cNvSpPr>
-          <p:nvPr>
-            <p:ph type="dt" sz="half" idx="10"/>
-          </p:nvPr>
-        </p:nvSpPr>
-        <p:spPr/>
-        <p:txBody>
-          <a:bodyPr/>
-          <a:lstStyle/>
-          <a:p>
-            <a:r>
-              <a:rPr lang="en-IN"/>
-              <a:t>25-Sep-19</a:t>
-            </a:r>
-            <a:endParaRPr lang="en-US"/>
-          </a:p>
-        </p:txBody>
-      </p:sp>
-      <p:sp>
-        <p:nvSpPr>
-          <p:cNvPr id="5" name="Footer Placeholder 4">
-            <a:extLst>
-              <a:ext uri="{FF2B5EF4-FFF2-40B4-BE49-F238E27FC236}">
-                <a16:creationId xmlns:a16="http://schemas.microsoft.com/office/drawing/2014/main" id="{635D098D-EF33-0347-B815-43E275D4543E}"/>
-              </a:ext>
-            </a:extLst>
-          </p:cNvPr>
-          <p:cNvSpPr>
-            <a:spLocks noGrp="1"/>
-          </p:cNvSpPr>
-          <p:nvPr>
-            <p:ph type="ftr" sz="quarter" idx="11"/>
-          </p:nvPr>
-        </p:nvSpPr>
-        <p:spPr/>
-        <p:txBody>
-          <a:bodyPr/>
-          <a:lstStyle/>
-          <a:p>
-            <a:r>
-              <a:rPr lang="en-US"/>
-              <a:t>PC Project Midsem Evaluation</a:t>
-            </a:r>
-          </a:p>
-        </p:txBody>
-      </p:sp>
+      </p:pic>
     </p:spTree>
     <p:extLst>
       <p:ext uri="{BB962C8B-B14F-4D97-AF65-F5344CB8AC3E}">
-        <p14:creationId xmlns:p14="http://schemas.microsoft.com/office/powerpoint/2010/main" val="3775099306"/>
+        <p14:creationId xmlns:p14="http://schemas.microsoft.com/office/powerpoint/2010/main" val="332226589"/>
       </p:ext>
     </p:extLst>
   </p:cSld>

</xml_diff>